<commit_message>
image slider with powerpoint iframe
</commit_message>
<xml_diff>
--- a/slides/Attention Is All You Need.pptx
+++ b/slides/Attention Is All You Need.pptx
@@ -3245,7 +3245,7 @@
                   <a:srgbClr val="000000"/>
                 </a:solidFill>
               </a:rPr>
-              <a:t>Recurrent neural networks have been firmly established as state-of-the-art approaches in sequence modeling and transduction problems such as language modeling and machine translation .</a:t>
+              <a:t>Recurrent neural networks have been state-of-the-art for sequence modeling and transduction tasks .</a:t>
             </a:r>
           </a:p>
           <a:p>
@@ -3260,7 +3260,7 @@
                   <a:srgbClr val="000000"/>
                 </a:solidFill>
               </a:rPr>
-              <a:t>Numerous efforts have been made to push boundaries of recurrent language models and encoder-decoder architectures .</a:t>
+              <a:t>However , they suffer from sequential computation , limiting parallelization and preventing longer sequence lengths .</a:t>
             </a:r>
           </a:p>
           <a:p>
@@ -3275,37 +3275,7 @@
                   <a:srgbClr val="000000"/>
                 </a:solidFill>
               </a:rPr>
-              <a:t>Recurrent models typically factor computation along symbol positions of input and output sequences .</a:t>
-            </a:r>
-          </a:p>
-          <a:p>
-            <a:pPr>
-              <a:defRPr sz="2800" b="0">
-                <a:latin typeface="Arial"/>
-              </a:defRPr>
-            </a:pPr>
-            <a:r>
-              <a:rPr>
-                <a:solidFill>
-                  <a:srgbClr val="000000"/>
-                </a:solidFill>
-              </a:rPr>
-              <a:t>Aligning positions to steps in computation time , they generate sequence of hidden states ht , as function of previous hidden state1 and input for position t.</a:t>
-            </a:r>
-          </a:p>
-          <a:p>
-            <a:pPr>
-              <a:defRPr sz="2800" b="0">
-                <a:latin typeface="Arial"/>
-              </a:defRPr>
-            </a:pPr>
-            <a:r>
-              <a:rPr>
-                <a:solidFill>
-                  <a:srgbClr val="000000"/>
-                </a:solidFill>
-              </a:rPr>
-              <a:t>This inherently sequential nature precludes parallelization within training examples , which becomes critical at longer sequence lengths , as memory constraints limit batching across examples .</a:t>
+              <a:t>Attention mechanisms have become integral to sequence modeling , but they are typically used with recurrent networks .</a:t>
             </a:r>
           </a:p>
         </p:txBody>
@@ -3395,7 +3365,7 @@
                   <a:srgbClr val="000000"/>
                 </a:solidFill>
               </a:rPr>
-              <a:t>Attention mechanisms have become integral part of compelling sequence modeling and transduc-tion models in various tasks , allowing modeling of dependencies without regard to their distance in input or output sequences .</a:t>
+              <a:t>nan ; Recent advances in computational efficiency include factorization tricks and conditional computation .</a:t>
             </a:r>
           </a:p>
           <a:p>
@@ -3410,7 +3380,7 @@
                   <a:srgbClr val="000000"/>
                 </a:solidFill>
               </a:rPr>
-              <a:t>In all but few cases , however , such attention mechanisms are used in conjunction with recurrent network .</a:t>
+              <a:t>However , fundamental constraint of sequential computation remains .</a:t>
             </a:r>
           </a:p>
           <a:p>
@@ -3425,7 +3395,37 @@
                   <a:srgbClr val="000000"/>
                 </a:solidFill>
               </a:rPr>
-              <a:t>In this work , we propose Transformer , model architecture eschewing recurrence and instead relying entirely on attention mechanism to draw global dependencies between input and output .</a:t>
+              <a:t>Attention mechanisms have become integral part of compelling sequence modeling and transduction models in various tasks , allowing modeling of dependencies without regard to their distance in input or output sequences .</a:t>
+            </a:r>
+          </a:p>
+          <a:p>
+            <a:pPr>
+              <a:defRPr sz="2800" b="0">
+                <a:latin typeface="Arial"/>
+              </a:defRPr>
+            </a:pPr>
+            <a:r>
+              <a:rPr>
+                <a:solidFill>
+                  <a:srgbClr val="000000"/>
+                </a:solidFill>
+              </a:rPr>
+              <a:t>In all but few cases , however , such attention mechanisms are used in conjunction with recurrent network .</a:t>
+            </a:r>
+          </a:p>
+          <a:p>
+            <a:pPr>
+              <a:defRPr sz="2800" b="0">
+                <a:latin typeface="Arial"/>
+              </a:defRPr>
+            </a:pPr>
+            <a:r>
+              <a:rPr>
+                <a:solidFill>
+                  <a:srgbClr val="000000"/>
+                </a:solidFill>
+              </a:rPr>
+              <a:t>; nan</a:t>
             </a:r>
           </a:p>
         </p:txBody>
@@ -3515,7 +3515,7 @@
                   <a:srgbClr val="000000"/>
                 </a:solidFill>
               </a:rPr>
-              <a:t>Transformer follows this overall architecture using stacked self-attention and point-wise , fully connected layers for both encoder and decoder , shown in left and right halves of Figure 1 .</a:t>
+              <a:t>Transformer follows encoder-decoder structure with stacked self-attention and point-wise , fully connected layers for both encoder and decoder .</a:t>
             </a:r>
           </a:p>
           <a:p>
@@ -3530,7 +3530,7 @@
                   <a:srgbClr val="000000"/>
                 </a:solidFill>
               </a:rPr>
-              <a:t>encoder is composed of stack of N = identical layers , and second is simple , position-wise fully connected feed-forward network .</a:t>
+              <a:t>Attention is computed using scaled dot-product attention , where weights are computed by compatibility function of query with corresponding key .</a:t>
             </a:r>
           </a:p>
           <a:p>
@@ -3545,7 +3545,7 @@
                   <a:srgbClr val="000000"/>
                 </a:solidFill>
               </a:rPr>
-              <a:t>output of each sub-layer is LayerNorm ( x + Sublayer ( x ) ) , where Sublayer ( x ) is function implemented by sublayer itself .</a:t>
+              <a:t>Multi-head attention consists of several attention layers running in parallel .</a:t>
             </a:r>
           </a:p>
           <a:p>
@@ -3560,7 +3560,7 @@
                   <a:srgbClr val="000000"/>
                 </a:solidFill>
               </a:rPr>
-              <a:t>To facilitate these residual connections around each of two layers in each encoder stack , we compute dot products of query with all keys , divide each by dk , and apply softmax function to obtain weighted dot-value pairs .</a:t>
+              <a:t>Positional encodings are added to input embeddings to inject information about relative or absolute position of tokens in sequence .</a:t>
             </a:r>
           </a:p>
         </p:txBody>
@@ -3650,7 +3650,7 @@
                   <a:srgbClr val="000000"/>
                 </a:solidFill>
               </a:rPr>
-              <a:t>nan ; This paper presents comprehensive review of literature , including literature review , and study 's findings .</a:t>
+              <a:t>Transformer achieves state-of-the-art results on two machine translation tasks , outperforming existing best results , including ensembles , by over 2 BLEU on WMT 2014 English-to-German translation task .</a:t>
             </a:r>
           </a:p>
           <a:p>
@@ -3665,7 +3665,22 @@
                   <a:srgbClr val="000000"/>
                 </a:solidFill>
               </a:rPr>
-              <a:t>authors conclude that study aims to improve quality of our work .</a:t>
+              <a:t>Transformer establishes new single-model state of art score of 41.8 after training for 3.5 days on eight GPUs .</a:t>
+            </a:r>
+          </a:p>
+          <a:p>
+            <a:pPr>
+              <a:defRPr sz="2800" b="0">
+                <a:latin typeface="Arial"/>
+              </a:defRPr>
+            </a:pPr>
+            <a:r>
+              <a:rPr>
+                <a:solidFill>
+                  <a:srgbClr val="000000"/>
+                </a:solidFill>
+              </a:rPr>
+              <a:t>It also generalizes well to other tasks , such as English constituency parsing .</a:t>
             </a:r>
           </a:p>
         </p:txBody>
@@ -3755,7 +3770,7 @@
                   <a:srgbClr val="000000"/>
                 </a:solidFill>
               </a:rPr>
-              <a:t>We propose new simple network architecture , Transformer , based solely on attention mechanisms , dispensing with recurrence and convolution entirely .</a:t>
+              <a:t>Transformer introduces new architecture for sequence transduction tasks , which is based solely on attention mechanisms and dispenses with recurrence and convolution entirely .</a:t>
             </a:r>
           </a:p>
           <a:p>
@@ -3770,7 +3785,7 @@
                   <a:srgbClr val="000000"/>
                 </a:solidFill>
               </a:rPr>
-              <a:t>Experiments on two machine translation tasks show that these models are superior in quality while being more parallelizable and requiring significantly less time to train .</a:t>
+              <a:t>This architecture allows for significantly more parallelization and can reach new state of art in translation quality after being trained for as little as twelve hours on eight P100 GPUs .</a:t>
             </a:r>
           </a:p>
           <a:p>
@@ -3785,37 +3800,7 @@
                   <a:srgbClr val="000000"/>
                 </a:solidFill>
               </a:rPr>
-              <a:t>Our model achieves 28.4 BLEU on WMT 2014 English-to-German translation task , improving over existing best results , including ensembles , by over BLUE .</a:t>
-            </a:r>
-          </a:p>
-          <a:p>
-            <a:pPr>
-              <a:defRPr sz="2800" b="0">
-                <a:latin typeface="Arial"/>
-              </a:defRPr>
-            </a:pPr>
-            <a:r>
-              <a:rPr>
-                <a:solidFill>
-                  <a:srgbClr val="000000"/>
-                </a:solidFill>
-              </a:rPr>
-              <a:t>On English-To-French translation task on eight GPUs , small fraction of training costs of best models from literature .</a:t>
-            </a:r>
-          </a:p>
-          <a:p>
-            <a:pPr>
-              <a:defRPr sz="2800" b="0">
-                <a:latin typeface="Arial"/>
-              </a:defRPr>
-            </a:pPr>
-            <a:r>
-              <a:rPr>
-                <a:solidFill>
-                  <a:srgbClr val="000000"/>
-                </a:solidFill>
-              </a:rPr>
-              <a:t>model establishes single-model state-of-the-art score of 41.8 after training for 3.5 days on 8 GPUs .</a:t>
+              <a:t>Transformer also generalizes well to other tasks such as English constituency parsing .</a:t>
             </a:r>
           </a:p>
         </p:txBody>

</xml_diff>